<commit_message>
Add more functional requirements
</commit_message>
<xml_diff>
--- a/Finposter.pptx
+++ b/Finposter.pptx
@@ -133,7 +133,7 @@
 </file>
 
 <file path=ppt/charts/chart1.xml><?xml version="1.0" encoding="utf-8"?>
-<c:chartSpace xmlns:c="http://schemas.openxmlformats.org/drawingml/2006/chart" xmlns:a="http://schemas.openxmlformats.org/drawingml/2006/main" xmlns:r="http://schemas.openxmlformats.org/officeDocument/2006/relationships" xmlns:c16r2="http://schemas.microsoft.com/office/drawing/2015/06/chart">
+<c:chartSpace xmlns:c="http://schemas.openxmlformats.org/drawingml/2006/chart" xmlns:a="http://schemas.openxmlformats.org/drawingml/2006/main" xmlns:r="http://schemas.openxmlformats.org/officeDocument/2006/relationships">
   <c:date1904 val="0"/>
   <c:lang val="en-US"/>
   <c:roundedCorners val="0"/>
@@ -251,7 +251,7 @@
               </c:numCache>
             </c:numRef>
           </c:val>
-          <c:extLst>
+          <c:extLst xmlns:c16r2="http://schemas.microsoft.com/office/drawing/2015/06/chart">
             <c:ext xmlns:c16="http://schemas.microsoft.com/office/drawing/2014/chart" uri="{C3380CC4-5D6E-409C-BE32-E72D297353CC}">
               <c16:uniqueId val="{00000000-6146-487D-B51A-ED6A99B1144A}"/>
             </c:ext>
@@ -324,7 +324,7 @@
               </c:numCache>
             </c:numRef>
           </c:val>
-          <c:extLst>
+          <c:extLst xmlns:c16r2="http://schemas.microsoft.com/office/drawing/2015/06/chart">
             <c:ext xmlns:c16="http://schemas.microsoft.com/office/drawing/2014/chart" uri="{C3380CC4-5D6E-409C-BE32-E72D297353CC}">
               <c16:uniqueId val="{00000001-6146-487D-B51A-ED6A99B1144A}"/>
             </c:ext>
@@ -397,7 +397,7 @@
               </c:numCache>
             </c:numRef>
           </c:val>
-          <c:extLst>
+          <c:extLst xmlns:c16r2="http://schemas.microsoft.com/office/drawing/2015/06/chart">
             <c:ext xmlns:c16="http://schemas.microsoft.com/office/drawing/2014/chart" uri="{C3380CC4-5D6E-409C-BE32-E72D297353CC}">
               <c16:uniqueId val="{00000002-6146-487D-B51A-ED6A99B1144A}"/>
             </c:ext>
@@ -413,11 +413,11 @@
         </c:dLbls>
         <c:gapWidth val="80"/>
         <c:overlap val="25"/>
-        <c:axId val="308085608"/>
-        <c:axId val="308086784"/>
+        <c:axId val="304647952"/>
+        <c:axId val="304648344"/>
       </c:barChart>
       <c:catAx>
-        <c:axId val="308085608"/>
+        <c:axId val="304647952"/>
         <c:scaling>
           <c:orientation val="minMax"/>
         </c:scaling>
@@ -460,7 +460,7 @@
             <a:endParaRPr lang="en-US"/>
           </a:p>
         </c:txPr>
-        <c:crossAx val="308086784"/>
+        <c:crossAx val="304648344"/>
         <c:crosses val="autoZero"/>
         <c:auto val="1"/>
         <c:lblAlgn val="ctr"/>
@@ -468,7 +468,7 @@
         <c:noMultiLvlLbl val="0"/>
       </c:catAx>
       <c:valAx>
-        <c:axId val="308086784"/>
+        <c:axId val="304648344"/>
         <c:scaling>
           <c:orientation val="minMax"/>
         </c:scaling>
@@ -519,7 +519,7 @@
             <a:endParaRPr lang="en-US"/>
           </a:p>
         </c:txPr>
-        <c:crossAx val="308085608"/>
+        <c:crossAx val="304647952"/>
         <c:crosses val="autoZero"/>
         <c:crossBetween val="between"/>
       </c:valAx>
@@ -3769,31 +3769,31 @@
     </dgm:pt>
   </dgm:ptLst>
   <dgm:cxnLst>
+    <dgm:cxn modelId="{CA8B89D3-A3E5-41AB-9C8A-76BEC3920398}" type="presOf" srcId="{A518A75D-9854-4CDE-9FB7-B1EBB324AAED}" destId="{770E20EC-6929-4A45-99D5-285545E37892}" srcOrd="0" destOrd="0" presId="urn:microsoft.com/office/officeart/2008/layout/TitlePictureLineup"/>
+    <dgm:cxn modelId="{DBBDC941-989D-413A-9312-8A594539259D}" srcId="{A518A75D-9854-4CDE-9FB7-B1EBB324AAED}" destId="{E7AE3FBE-5B9C-4D06-BE89-1BE650FBB372}" srcOrd="1" destOrd="0" parTransId="{200A9817-5ED8-487A-BA3D-F0E2827F17E0}" sibTransId="{F69E3BF4-B198-4E69-89A9-FFE8DD91FD2D}"/>
+    <dgm:cxn modelId="{0990249C-5F83-4AC6-BBDE-76609E41C3B7}" srcId="{0F8DBA57-A3BA-4BC9-A853-67B71E3B3531}" destId="{D0989AE5-C818-44D5-8AE6-32DEAF6F46CC}" srcOrd="0" destOrd="0" parTransId="{5116A57A-5F5C-441B-8E98-72FC83223934}" sibTransId="{0B13468D-FE4E-4A8A-A598-8159F0C900A0}"/>
+    <dgm:cxn modelId="{D342263E-1934-4357-BB1A-71C6DACC5C2D}" type="presOf" srcId="{189900D0-D8F1-4F9B-8FA2-67D14247AE98}" destId="{5ABBC393-AD16-4772-8402-4ABCB8683B4E}" srcOrd="0" destOrd="2" presId="urn:microsoft.com/office/officeart/2008/layout/TitlePictureLineup"/>
+    <dgm:cxn modelId="{C84F12B6-3EE3-4557-A9DE-5ECD9E203BEF}" type="presOf" srcId="{0F8DBA57-A3BA-4BC9-A853-67B71E3B3531}" destId="{B3686B38-0C87-411A-9F82-923E333643FB}" srcOrd="0" destOrd="0" presId="urn:microsoft.com/office/officeart/2008/layout/TitlePictureLineup"/>
     <dgm:cxn modelId="{21B7AB36-1C2E-4E8E-BAFE-E7BF013A0E25}" srcId="{677FC8B7-2875-43E9-9CDF-1CB72AAB0D0E}" destId="{A9B56225-2ADD-49DA-81AC-70F2AF1C4A96}" srcOrd="0" destOrd="0" parTransId="{0BDA5908-E6FD-4F09-9B29-F0DA4C25A334}" sibTransId="{430BF9A0-6AC4-4B0D-A7AB-5C13328C2783}"/>
+    <dgm:cxn modelId="{4B471AE2-396E-4C5C-9110-4123DA6DCE53}" srcId="{25AF84C7-6ED7-450C-83EA-4337CE735A70}" destId="{300FCD3E-1ADF-4D8E-8B7F-C23D248E5AA3}" srcOrd="0" destOrd="0" parTransId="{BC272908-DB90-4FCA-8784-0CA7E6A97E8F}" sibTransId="{4A78B380-1F85-4365-BF1F-0BD8AD7C8590}"/>
+    <dgm:cxn modelId="{0594AC27-942D-4970-9412-5DFB15A14059}" type="presOf" srcId="{E7AE3FBE-5B9C-4D06-BE89-1BE650FBB372}" destId="{5ABBC393-AD16-4772-8402-4ABCB8683B4E}" srcOrd="0" destOrd="1" presId="urn:microsoft.com/office/officeart/2008/layout/TitlePictureLineup"/>
+    <dgm:cxn modelId="{B7AA9BCE-D649-4F1B-B108-93466D2481F6}" srcId="{A518A75D-9854-4CDE-9FB7-B1EBB324AAED}" destId="{48328429-D21F-4CF6-9089-EE3F5F57F2AC}" srcOrd="0" destOrd="0" parTransId="{1635AB15-42A4-42D6-9F2B-33788AD7A83B}" sibTransId="{C822654F-BF62-47E3-96FD-AE4B604B788B}"/>
+    <dgm:cxn modelId="{4A1C38F0-EE99-5C4F-8E05-0DE90E45B87E}" type="presOf" srcId="{5F733BB1-0E9D-464E-9AF1-7D1ED1D4436E}" destId="{5ABBC393-AD16-4772-8402-4ABCB8683B4E}" srcOrd="0" destOrd="4" presId="urn:microsoft.com/office/officeart/2008/layout/TitlePictureLineup"/>
+    <dgm:cxn modelId="{71BE7CB9-6CCB-4CD8-9BAB-7CAFA1B25C77}" type="presOf" srcId="{62A7DEA9-88DD-477E-915C-AB9E3A038B10}" destId="{5ABBC393-AD16-4772-8402-4ABCB8683B4E}" srcOrd="0" destOrd="3" presId="urn:microsoft.com/office/officeart/2008/layout/TitlePictureLineup"/>
+    <dgm:cxn modelId="{97DC5797-804D-44AB-A7F2-9EB61CACB1D5}" srcId="{25AFBC85-EE41-46FB-A7F4-99ED4084C835}" destId="{677FC8B7-2875-43E9-9CDF-1CB72AAB0D0E}" srcOrd="3" destOrd="0" parTransId="{135D044B-CF2D-4837-B65C-369AE7EBF5F6}" sibTransId="{76FCE978-AC8C-47A4-866D-929EE0B68914}"/>
+    <dgm:cxn modelId="{9140734E-E639-4086-9B62-F9B15D8D45A9}" type="presOf" srcId="{D0989AE5-C818-44D5-8AE6-32DEAF6F46CC}" destId="{EBE06ADE-C892-44D3-AB90-0EE941CCA21D}" srcOrd="0" destOrd="0" presId="urn:microsoft.com/office/officeart/2008/layout/TitlePictureLineup"/>
+    <dgm:cxn modelId="{447AF68F-5153-4E01-A5A1-8D3A25A73007}" srcId="{25AFBC85-EE41-46FB-A7F4-99ED4084C835}" destId="{25AF84C7-6ED7-450C-83EA-4337CE735A70}" srcOrd="1" destOrd="0" parTransId="{33168ED3-1516-4DE0-87C6-D0BBEBB68307}" sibTransId="{2562C856-622C-43A4-99D0-A7FF0C835EBA}"/>
+    <dgm:cxn modelId="{951AB036-7A1D-4DCF-8595-B29E9F00F3BE}" type="presOf" srcId="{677FC8B7-2875-43E9-9CDF-1CB72AAB0D0E}" destId="{4E89074A-DD45-4C30-BE68-0847302086FD}" srcOrd="0" destOrd="0" presId="urn:microsoft.com/office/officeart/2008/layout/TitlePictureLineup"/>
+    <dgm:cxn modelId="{6A0A065E-D593-4F6E-BB02-BF63EE5BC407}" type="presOf" srcId="{25AFBC85-EE41-46FB-A7F4-99ED4084C835}" destId="{8C6E4A05-D928-421F-BB35-AB0FFEB0B7C4}" srcOrd="0" destOrd="0" presId="urn:microsoft.com/office/officeart/2008/layout/TitlePictureLineup"/>
     <dgm:cxn modelId="{3B5E0E62-E146-4A50-AD08-1ED1B5CE454B}" srcId="{A518A75D-9854-4CDE-9FB7-B1EBB324AAED}" destId="{62A7DEA9-88DD-477E-915C-AB9E3A038B10}" srcOrd="3" destOrd="0" parTransId="{2091A7D9-9656-48AA-BCE0-25CE3EE56AE8}" sibTransId="{B015450C-B126-4C68-A7D8-E2079ABADDA9}"/>
-    <dgm:cxn modelId="{D342263E-1934-4357-BB1A-71C6DACC5C2D}" type="presOf" srcId="{189900D0-D8F1-4F9B-8FA2-67D14247AE98}" destId="{5ABBC393-AD16-4772-8402-4ABCB8683B4E}" srcOrd="0" destOrd="2" presId="urn:microsoft.com/office/officeart/2008/layout/TitlePictureLineup"/>
-    <dgm:cxn modelId="{71BE7CB9-6CCB-4CD8-9BAB-7CAFA1B25C77}" type="presOf" srcId="{62A7DEA9-88DD-477E-915C-AB9E3A038B10}" destId="{5ABBC393-AD16-4772-8402-4ABCB8683B4E}" srcOrd="0" destOrd="3" presId="urn:microsoft.com/office/officeart/2008/layout/TitlePictureLineup"/>
-    <dgm:cxn modelId="{0594AC27-942D-4970-9412-5DFB15A14059}" type="presOf" srcId="{E7AE3FBE-5B9C-4D06-BE89-1BE650FBB372}" destId="{5ABBC393-AD16-4772-8402-4ABCB8683B4E}" srcOrd="0" destOrd="1" presId="urn:microsoft.com/office/officeart/2008/layout/TitlePictureLineup"/>
-    <dgm:cxn modelId="{951AB036-7A1D-4DCF-8595-B29E9F00F3BE}" type="presOf" srcId="{677FC8B7-2875-43E9-9CDF-1CB72AAB0D0E}" destId="{4E89074A-DD45-4C30-BE68-0847302086FD}" srcOrd="0" destOrd="0" presId="urn:microsoft.com/office/officeart/2008/layout/TitlePictureLineup"/>
-    <dgm:cxn modelId="{C84F12B6-3EE3-4557-A9DE-5ECD9E203BEF}" type="presOf" srcId="{0F8DBA57-A3BA-4BC9-A853-67B71E3B3531}" destId="{B3686B38-0C87-411A-9F82-923E333643FB}" srcOrd="0" destOrd="0" presId="urn:microsoft.com/office/officeart/2008/layout/TitlePictureLineup"/>
-    <dgm:cxn modelId="{4B471AE2-396E-4C5C-9110-4123DA6DCE53}" srcId="{25AF84C7-6ED7-450C-83EA-4337CE735A70}" destId="{300FCD3E-1ADF-4D8E-8B7F-C23D248E5AA3}" srcOrd="0" destOrd="0" parTransId="{BC272908-DB90-4FCA-8784-0CA7E6A97E8F}" sibTransId="{4A78B380-1F85-4365-BF1F-0BD8AD7C8590}"/>
+    <dgm:cxn modelId="{E5053C00-76EC-4519-ABF3-0ACDA95BE163}" srcId="{25AFBC85-EE41-46FB-A7F4-99ED4084C835}" destId="{A518A75D-9854-4CDE-9FB7-B1EBB324AAED}" srcOrd="0" destOrd="0" parTransId="{8A2D5E86-42BC-415B-A1DE-0C28EEB3661C}" sibTransId="{FF440F30-5F7D-44F0-8264-C65521A11F0C}"/>
     <dgm:cxn modelId="{E003B334-5224-4D62-B853-FA481A6CA493}" type="presOf" srcId="{A9B56225-2ADD-49DA-81AC-70F2AF1C4A96}" destId="{2A1C86DE-9AB9-421D-8408-47DA191A0168}" srcOrd="0" destOrd="0" presId="urn:microsoft.com/office/officeart/2008/layout/TitlePictureLineup"/>
+    <dgm:cxn modelId="{4A4ADF06-6D3D-43CF-9662-53E434EE742F}" type="presOf" srcId="{25AF84C7-6ED7-450C-83EA-4337CE735A70}" destId="{16EEE8E2-3D18-44F6-B04A-3D59841E4FA8}" srcOrd="0" destOrd="0" presId="urn:microsoft.com/office/officeart/2008/layout/TitlePictureLineup"/>
+    <dgm:cxn modelId="{B724B512-D13F-42E5-8E9D-6F0A3CE544D8}" type="presOf" srcId="{48328429-D21F-4CF6-9089-EE3F5F57F2AC}" destId="{5ABBC393-AD16-4772-8402-4ABCB8683B4E}" srcOrd="0" destOrd="0" presId="urn:microsoft.com/office/officeart/2008/layout/TitlePictureLineup"/>
+    <dgm:cxn modelId="{BC99CF63-34B5-4D4D-84B8-160D4C4D99B0}" type="presOf" srcId="{300FCD3E-1ADF-4D8E-8B7F-C23D248E5AA3}" destId="{A0810939-5D65-4F5C-894F-F86C706A7A1C}" srcOrd="0" destOrd="0" presId="urn:microsoft.com/office/officeart/2008/layout/TitlePictureLineup"/>
     <dgm:cxn modelId="{04033EED-8DB1-6C40-81C3-2340DC18AAC0}" srcId="{A518A75D-9854-4CDE-9FB7-B1EBB324AAED}" destId="{5F733BB1-0E9D-464E-9AF1-7D1ED1D4436E}" srcOrd="4" destOrd="0" parTransId="{A8A9D014-3B50-8D4A-BD40-9773B5E3920D}" sibTransId="{D07C801F-EC5D-A745-9F46-FD0C18F91C34}"/>
-    <dgm:cxn modelId="{0990249C-5F83-4AC6-BBDE-76609E41C3B7}" srcId="{0F8DBA57-A3BA-4BC9-A853-67B71E3B3531}" destId="{D0989AE5-C818-44D5-8AE6-32DEAF6F46CC}" srcOrd="0" destOrd="0" parTransId="{5116A57A-5F5C-441B-8E98-72FC83223934}" sibTransId="{0B13468D-FE4E-4A8A-A598-8159F0C900A0}"/>
-    <dgm:cxn modelId="{B7AA9BCE-D649-4F1B-B108-93466D2481F6}" srcId="{A518A75D-9854-4CDE-9FB7-B1EBB324AAED}" destId="{48328429-D21F-4CF6-9089-EE3F5F57F2AC}" srcOrd="0" destOrd="0" parTransId="{1635AB15-42A4-42D6-9F2B-33788AD7A83B}" sibTransId="{C822654F-BF62-47E3-96FD-AE4B604B788B}"/>
+    <dgm:cxn modelId="{81AE50C2-F587-470B-86FC-B5A28EFEE1BC}" srcId="{25AFBC85-EE41-46FB-A7F4-99ED4084C835}" destId="{0F8DBA57-A3BA-4BC9-A853-67B71E3B3531}" srcOrd="2" destOrd="0" parTransId="{99BB5F99-B845-4128-856A-D40FE489F4C0}" sibTransId="{CD82CFE7-3793-47B0-8B52-9C19EDB40EDE}"/>
     <dgm:cxn modelId="{B53D56D0-5337-464A-911A-99DC6BCA64D0}" srcId="{A518A75D-9854-4CDE-9FB7-B1EBB324AAED}" destId="{189900D0-D8F1-4F9B-8FA2-67D14247AE98}" srcOrd="2" destOrd="0" parTransId="{1CA0F803-7A03-404B-AAF1-6D52E9FD5427}" sibTransId="{5AFFD507-4550-457B-961B-748A797CBB71}"/>
-    <dgm:cxn modelId="{97DC5797-804D-44AB-A7F2-9EB61CACB1D5}" srcId="{25AFBC85-EE41-46FB-A7F4-99ED4084C835}" destId="{677FC8B7-2875-43E9-9CDF-1CB72AAB0D0E}" srcOrd="3" destOrd="0" parTransId="{135D044B-CF2D-4837-B65C-369AE7EBF5F6}" sibTransId="{76FCE978-AC8C-47A4-866D-929EE0B68914}"/>
-    <dgm:cxn modelId="{DBBDC941-989D-413A-9312-8A594539259D}" srcId="{A518A75D-9854-4CDE-9FB7-B1EBB324AAED}" destId="{E7AE3FBE-5B9C-4D06-BE89-1BE650FBB372}" srcOrd="1" destOrd="0" parTransId="{200A9817-5ED8-487A-BA3D-F0E2827F17E0}" sibTransId="{F69E3BF4-B198-4E69-89A9-FFE8DD91FD2D}"/>
-    <dgm:cxn modelId="{E5053C00-76EC-4519-ABF3-0ACDA95BE163}" srcId="{25AFBC85-EE41-46FB-A7F4-99ED4084C835}" destId="{A518A75D-9854-4CDE-9FB7-B1EBB324AAED}" srcOrd="0" destOrd="0" parTransId="{8A2D5E86-42BC-415B-A1DE-0C28EEB3661C}" sibTransId="{FF440F30-5F7D-44F0-8264-C65521A11F0C}"/>
-    <dgm:cxn modelId="{447AF68F-5153-4E01-A5A1-8D3A25A73007}" srcId="{25AFBC85-EE41-46FB-A7F4-99ED4084C835}" destId="{25AF84C7-6ED7-450C-83EA-4337CE735A70}" srcOrd="1" destOrd="0" parTransId="{33168ED3-1516-4DE0-87C6-D0BBEBB68307}" sibTransId="{2562C856-622C-43A4-99D0-A7FF0C835EBA}"/>
-    <dgm:cxn modelId="{4A4ADF06-6D3D-43CF-9662-53E434EE742F}" type="presOf" srcId="{25AF84C7-6ED7-450C-83EA-4337CE735A70}" destId="{16EEE8E2-3D18-44F6-B04A-3D59841E4FA8}" srcOrd="0" destOrd="0" presId="urn:microsoft.com/office/officeart/2008/layout/TitlePictureLineup"/>
-    <dgm:cxn modelId="{BC99CF63-34B5-4D4D-84B8-160D4C4D99B0}" type="presOf" srcId="{300FCD3E-1ADF-4D8E-8B7F-C23D248E5AA3}" destId="{A0810939-5D65-4F5C-894F-F86C706A7A1C}" srcOrd="0" destOrd="0" presId="urn:microsoft.com/office/officeart/2008/layout/TitlePictureLineup"/>
-    <dgm:cxn modelId="{CA8B89D3-A3E5-41AB-9C8A-76BEC3920398}" type="presOf" srcId="{A518A75D-9854-4CDE-9FB7-B1EBB324AAED}" destId="{770E20EC-6929-4A45-99D5-285545E37892}" srcOrd="0" destOrd="0" presId="urn:microsoft.com/office/officeart/2008/layout/TitlePictureLineup"/>
-    <dgm:cxn modelId="{B724B512-D13F-42E5-8E9D-6F0A3CE544D8}" type="presOf" srcId="{48328429-D21F-4CF6-9089-EE3F5F57F2AC}" destId="{5ABBC393-AD16-4772-8402-4ABCB8683B4E}" srcOrd="0" destOrd="0" presId="urn:microsoft.com/office/officeart/2008/layout/TitlePictureLineup"/>
-    <dgm:cxn modelId="{9140734E-E639-4086-9B62-F9B15D8D45A9}" type="presOf" srcId="{D0989AE5-C818-44D5-8AE6-32DEAF6F46CC}" destId="{EBE06ADE-C892-44D3-AB90-0EE941CCA21D}" srcOrd="0" destOrd="0" presId="urn:microsoft.com/office/officeart/2008/layout/TitlePictureLineup"/>
-    <dgm:cxn modelId="{81AE50C2-F587-470B-86FC-B5A28EFEE1BC}" srcId="{25AFBC85-EE41-46FB-A7F4-99ED4084C835}" destId="{0F8DBA57-A3BA-4BC9-A853-67B71E3B3531}" srcOrd="2" destOrd="0" parTransId="{99BB5F99-B845-4128-856A-D40FE489F4C0}" sibTransId="{CD82CFE7-3793-47B0-8B52-9C19EDB40EDE}"/>
-    <dgm:cxn modelId="{4A1C38F0-EE99-5C4F-8E05-0DE90E45B87E}" type="presOf" srcId="{5F733BB1-0E9D-464E-9AF1-7D1ED1D4436E}" destId="{5ABBC393-AD16-4772-8402-4ABCB8683B4E}" srcOrd="0" destOrd="4" presId="urn:microsoft.com/office/officeart/2008/layout/TitlePictureLineup"/>
-    <dgm:cxn modelId="{6A0A065E-D593-4F6E-BB02-BF63EE5BC407}" type="presOf" srcId="{25AFBC85-EE41-46FB-A7F4-99ED4084C835}" destId="{8C6E4A05-D928-421F-BB35-AB0FFEB0B7C4}" srcOrd="0" destOrd="0" presId="urn:microsoft.com/office/officeart/2008/layout/TitlePictureLineup"/>
     <dgm:cxn modelId="{B5657A53-F7C5-449A-A28C-ADB1BD95AFAD}" type="presParOf" srcId="{8C6E4A05-D928-421F-BB35-AB0FFEB0B7C4}" destId="{8C8EDC2C-400F-4A87-B348-71B90CDC58F1}" srcOrd="0" destOrd="0" presId="urn:microsoft.com/office/officeart/2008/layout/TitlePictureLineup"/>
     <dgm:cxn modelId="{1C80C19B-C14E-453A-AD9B-0F519D412CCB}" type="presParOf" srcId="{8C8EDC2C-400F-4A87-B348-71B90CDC58F1}" destId="{53B4FA82-603E-4EDB-90A9-1DA699C2C901}" srcOrd="0" destOrd="0" presId="urn:microsoft.com/office/officeart/2008/layout/TitlePictureLineup"/>
     <dgm:cxn modelId="{0D6A37DD-154A-4327-B4B3-2A50C24373F9}" type="presParOf" srcId="{8C8EDC2C-400F-4A87-B348-71B90CDC58F1}" destId="{48475A52-D924-4818-BEE8-D250047D6B3F}" srcOrd="1" destOrd="0" presId="urn:microsoft.com/office/officeart/2008/layout/TitlePictureLineup"/>
@@ -12464,11 +12464,7 @@
             </a:r>
             <a:r>
               <a:rPr lang="en-US" dirty="0"/>
-              <a:t>due </a:t>
-            </a:r>
-            <a:r>
-              <a:rPr lang="en-US" dirty="0"/>
-              <a:t>to </a:t>
+              <a:t>due to </a:t>
             </a:r>
             <a:r>
               <a:rPr lang="en-US" dirty="0" smtClean="0"/>
@@ -12480,11 +12476,7 @@
             </a:r>
             <a:r>
               <a:rPr lang="en-US" dirty="0" smtClean="0"/>
-              <a:t>conditions, </a:t>
-            </a:r>
-            <a:r>
-              <a:rPr lang="en-US" dirty="0" smtClean="0"/>
-              <a:t>rapid population growth</a:t>
+              <a:t>conditions, rapid population growth</a:t>
             </a:r>
             <a:r>
               <a:rPr lang="en-US" dirty="0"/>
@@ -12492,11 +12484,7 @@
             </a:r>
             <a:r>
               <a:rPr lang="en-US" dirty="0" smtClean="0"/>
-              <a:t>and</a:t>
-            </a:r>
-            <a:r>
-              <a:rPr lang="en-US" dirty="0" smtClean="0"/>
-              <a:t> urbanization.</a:t>
+              <a:t>and urbanization.</a:t>
             </a:r>
           </a:p>
         </p:txBody>
@@ -12668,7 +12656,9 @@
           </a:xfrm>
         </p:spPr>
         <p:txBody>
-          <a:bodyPr/>
+          <a:bodyPr>
+            <a:normAutofit fontScale="77500" lnSpcReduction="20000"/>
+          </a:bodyPr>
           <a:lstStyle/>
           <a:p>
             <a:r>
@@ -12727,7 +12717,10 @@
               <a:buFont typeface="Wingdings" panose="05000000000000000000" pitchFamily="2" charset="2"/>
               <a:buChar char="Ø"/>
             </a:pPr>
-            <a:endParaRPr lang="en-US" dirty="0"/>
+            <a:r>
+              <a:rPr lang="en-US" dirty="0" smtClean="0"/>
+              <a:t>The system must analyze the sensor readings recorded over a specified period of time.</a:t>
+            </a:r>
           </a:p>
           <a:p>
             <a:pPr lvl="1">
@@ -12736,11 +12729,7 @@
             </a:pPr>
             <a:r>
               <a:rPr lang="en-US" dirty="0" smtClean="0"/>
-              <a:t>The </a:t>
-            </a:r>
-            <a:r>
-              <a:rPr lang="en-US" dirty="0"/>
-              <a:t>system must use the data collected in the database to automatically control the conditions within a greenhouse.</a:t>
+              <a:t>The system must display the sensor readings and the analyzed data on the web interface.</a:t>
             </a:r>
           </a:p>
           <a:p>
@@ -12750,11 +12739,31 @@
             </a:pPr>
             <a:r>
               <a:rPr lang="en-US" dirty="0" smtClean="0"/>
-              <a:t>The </a:t>
+              <a:t>The system must turn on the irrigation system when the soil moisture level is below the threshold value.</a:t>
+            </a:r>
+          </a:p>
+          <a:p>
+            <a:pPr lvl="1">
+              <a:buFont typeface="Wingdings" panose="05000000000000000000" pitchFamily="2" charset="2"/>
+              <a:buChar char="Ø"/>
+            </a:pPr>
+            <a:r>
+              <a:rPr lang="en-US" dirty="0" smtClean="0"/>
+              <a:t>The system must turn on the U.V lights when the light intensity is below the threshold.</a:t>
+            </a:r>
+          </a:p>
+          <a:p>
+            <a:pPr lvl="1">
+              <a:buFont typeface="Wingdings" panose="05000000000000000000" pitchFamily="2" charset="2"/>
+              <a:buChar char="Ø"/>
+            </a:pPr>
+            <a:r>
+              <a:rPr lang="en-US" dirty="0" smtClean="0"/>
+              <a:t>The system must turn on the funs when the temperature or humidity levels are above </a:t>
             </a:r>
             <a:r>
               <a:rPr lang="en-US" dirty="0"/>
-              <a:t>system must be able to analyze the data collected</a:t>
+              <a:t>the threshold </a:t>
             </a:r>
             <a:r>
               <a:rPr lang="en-US" dirty="0" smtClean="0"/>
@@ -12765,7 +12774,11 @@
           <a:p>
             <a:r>
               <a:rPr lang="en-US" dirty="0" smtClean="0"/>
-              <a:t>R2. Non-Functional</a:t>
+              <a:t>R2</a:t>
+            </a:r>
+            <a:r>
+              <a:rPr lang="en-US" dirty="0" smtClean="0"/>
+              <a:t>. Non-Functional</a:t>
             </a:r>
           </a:p>
           <a:p>
@@ -12964,11 +12977,7 @@
           <a:p>
             <a:r>
               <a:rPr lang="en-US" dirty="0" smtClean="0"/>
-              <a:t>Install cameras to observe th</a:t>
-            </a:r>
-            <a:r>
-              <a:rPr lang="en-US" dirty="0" smtClean="0"/>
-              <a:t>e greenhouse activities at real time remotely.</a:t>
+              <a:t>Install cameras to observe the greenhouse activities at real time remotely.</a:t>
             </a:r>
           </a:p>
           <a:p>

</xml_diff>

<commit_message>
Update poster add results, conclusion, and references.
</commit_message>
<xml_diff>
--- a/Finposter.pptx
+++ b/Finposter.pptx
@@ -413,11 +413,11 @@
         </c:dLbls>
         <c:gapWidth val="80"/>
         <c:overlap val="25"/>
-        <c:axId val="223413120"/>
-        <c:axId val="223412728"/>
+        <c:axId val="352391272"/>
+        <c:axId val="352389704"/>
       </c:barChart>
       <c:catAx>
-        <c:axId val="223413120"/>
+        <c:axId val="352391272"/>
         <c:scaling>
           <c:orientation val="minMax"/>
         </c:scaling>
@@ -460,7 +460,7 @@
             <a:endParaRPr lang="en-US"/>
           </a:p>
         </c:txPr>
-        <c:crossAx val="223412728"/>
+        <c:crossAx val="352389704"/>
         <c:crosses val="autoZero"/>
         <c:auto val="1"/>
         <c:lblAlgn val="ctr"/>
@@ -468,7 +468,7 @@
         <c:noMultiLvlLbl val="0"/>
       </c:catAx>
       <c:valAx>
-        <c:axId val="223412728"/>
+        <c:axId val="352389704"/>
         <c:scaling>
           <c:orientation val="minMax"/>
         </c:scaling>
@@ -519,7 +519,7 @@
             <a:endParaRPr lang="en-US"/>
           </a:p>
         </c:txPr>
-        <c:crossAx val="223413120"/>
+        <c:crossAx val="352391272"/>
         <c:crosses val="autoZero"/>
         <c:crossBetween val="between"/>
       </c:valAx>
@@ -2675,9 +2675,10 @@
         <a:lstStyle/>
         <a:p>
           <a:r>
-            <a:rPr lang="en-US" sz="2800" dirty="0"/>
-            <a:t>State what they will use the  system for</a:t>
+            <a:rPr lang="en-US" sz="2800" dirty="0" smtClean="0"/>
+            <a:t>Farmers will be able to carry out crop production throughout the year without the worry of weather and climatic changes.</a:t>
           </a:r>
+          <a:endParaRPr lang="en-US" sz="2800" dirty="0"/>
         </a:p>
       </dgm:t>
     </dgm:pt>
@@ -2748,9 +2749,10 @@
         <a:lstStyle/>
         <a:p>
           <a:r>
-            <a:rPr lang="en-US" sz="2800" dirty="0"/>
-            <a:t>State what they will use the  system for</a:t>
+            <a:rPr lang="en-US" sz="2800" dirty="0" smtClean="0"/>
+            <a:t>Plant researchers will use the data stored in the database to know which kind of plants grow better under what kind of conditions and make insightful predictions.</a:t>
           </a:r>
+          <a:endParaRPr lang="en-US" sz="2800" dirty="0"/>
         </a:p>
       </dgm:t>
     </dgm:pt>
@@ -2766,78 +2768,6 @@
       </dgm:t>
     </dgm:pt>
     <dgm:pt modelId="{631D11DF-11B6-487B-8148-E2BF1F9190AD}" type="sibTrans" cxnId="{31D0EEFF-9776-4597-8873-3B56F9091C86}">
-      <dgm:prSet/>
-      <dgm:spPr/>
-      <dgm:t>
-        <a:bodyPr/>
-        <a:lstStyle/>
-        <a:p>
-          <a:endParaRPr lang="en-US" sz="2800"/>
-        </a:p>
-      </dgm:t>
-    </dgm:pt>
-    <dgm:pt modelId="{2F8ECEAC-FAA3-4503-A169-57F41A503807}">
-      <dgm:prSet phldrT="[Text]" custT="1"/>
-      <dgm:spPr/>
-      <dgm:t>
-        <a:bodyPr/>
-        <a:lstStyle/>
-        <a:p>
-          <a:r>
-            <a:rPr lang="en-US" sz="2800" dirty="0"/>
-            <a:t>User category xx</a:t>
-          </a:r>
-        </a:p>
-      </dgm:t>
-    </dgm:pt>
-    <dgm:pt modelId="{ACAA3BC8-2CDA-42A5-8DD6-5A948ACC6FCF}" type="parTrans" cxnId="{24836079-9FDA-4F84-9291-518671EE6E30}">
-      <dgm:prSet/>
-      <dgm:spPr/>
-      <dgm:t>
-        <a:bodyPr/>
-        <a:lstStyle/>
-        <a:p>
-          <a:endParaRPr lang="en-US" sz="2800"/>
-        </a:p>
-      </dgm:t>
-    </dgm:pt>
-    <dgm:pt modelId="{61A568BF-D1AB-4345-9CA7-878468CAA9E0}" type="sibTrans" cxnId="{24836079-9FDA-4F84-9291-518671EE6E30}">
-      <dgm:prSet/>
-      <dgm:spPr/>
-      <dgm:t>
-        <a:bodyPr/>
-        <a:lstStyle/>
-        <a:p>
-          <a:endParaRPr lang="en-US" sz="2800"/>
-        </a:p>
-      </dgm:t>
-    </dgm:pt>
-    <dgm:pt modelId="{BB5A00DF-7368-4451-822A-C5213BEFEEBE}">
-      <dgm:prSet phldrT="[Text]" custT="1"/>
-      <dgm:spPr/>
-      <dgm:t>
-        <a:bodyPr/>
-        <a:lstStyle/>
-        <a:p>
-          <a:r>
-            <a:rPr lang="en-US" sz="2800" dirty="0"/>
-            <a:t>State what they will use the  system for</a:t>
-          </a:r>
-        </a:p>
-      </dgm:t>
-    </dgm:pt>
-    <dgm:pt modelId="{DBF05790-03E0-47D4-8137-1ED35487613F}" type="parTrans" cxnId="{3F455948-84CC-4BD3-B122-BC7FC520F6C2}">
-      <dgm:prSet/>
-      <dgm:spPr/>
-      <dgm:t>
-        <a:bodyPr/>
-        <a:lstStyle/>
-        <a:p>
-          <a:endParaRPr lang="en-US" sz="2800"/>
-        </a:p>
-      </dgm:t>
-    </dgm:pt>
-    <dgm:pt modelId="{1FC1A5B2-F57F-4D1D-AD7C-59801453B2A1}" type="sibTrans" cxnId="{3F455948-84CC-4BD3-B122-BC7FC520F6C2}">
       <dgm:prSet/>
       <dgm:spPr/>
       <dgm:t>
@@ -2870,7 +2800,7 @@
       <dgm:spPr/>
     </dgm:pt>
     <dgm:pt modelId="{B8C15370-9E21-4343-A577-4985C41A0B6E}" type="pres">
-      <dgm:prSet presAssocID="{06F1FE2A-97BA-4B52-B3A6-E44D1F20CB28}" presName="parTx" presStyleLbl="alignNode1" presStyleIdx="0" presStyleCnt="3">
+      <dgm:prSet presAssocID="{06F1FE2A-97BA-4B52-B3A6-E44D1F20CB28}" presName="parTx" presStyleLbl="alignNode1" presStyleIdx="0" presStyleCnt="2">
         <dgm:presLayoutVars>
           <dgm:chMax val="0"/>
           <dgm:chPref val="0"/>
@@ -2887,7 +2817,7 @@
       </dgm:t>
     </dgm:pt>
     <dgm:pt modelId="{DE65B54D-BB89-4898-B770-68834B90CB27}" type="pres">
-      <dgm:prSet presAssocID="{06F1FE2A-97BA-4B52-B3A6-E44D1F20CB28}" presName="desTx" presStyleLbl="alignAccFollowNode1" presStyleIdx="0" presStyleCnt="3">
+      <dgm:prSet presAssocID="{06F1FE2A-97BA-4B52-B3A6-E44D1F20CB28}" presName="desTx" presStyleLbl="alignAccFollowNode1" presStyleIdx="0" presStyleCnt="2">
         <dgm:presLayoutVars>
           <dgm:bulletEnabled val="1"/>
         </dgm:presLayoutVars>
@@ -2910,7 +2840,7 @@
       <dgm:spPr/>
     </dgm:pt>
     <dgm:pt modelId="{E01B3154-0666-4584-9FC4-432DE00CC402}" type="pres">
-      <dgm:prSet presAssocID="{184B56DA-A66C-4DD0-AE11-0A7EBA387E48}" presName="parTx" presStyleLbl="alignNode1" presStyleIdx="1" presStyleCnt="3">
+      <dgm:prSet presAssocID="{184B56DA-A66C-4DD0-AE11-0A7EBA387E48}" presName="parTx" presStyleLbl="alignNode1" presStyleIdx="1" presStyleCnt="2">
         <dgm:presLayoutVars>
           <dgm:chMax val="0"/>
           <dgm:chPref val="0"/>
@@ -2927,47 +2857,7 @@
       </dgm:t>
     </dgm:pt>
     <dgm:pt modelId="{6EC96761-7A7E-46B1-9A31-B92F49834D5A}" type="pres">
-      <dgm:prSet presAssocID="{184B56DA-A66C-4DD0-AE11-0A7EBA387E48}" presName="desTx" presStyleLbl="alignAccFollowNode1" presStyleIdx="1" presStyleCnt="3">
-        <dgm:presLayoutVars>
-          <dgm:bulletEnabled val="1"/>
-        </dgm:presLayoutVars>
-      </dgm:prSet>
-      <dgm:spPr/>
-      <dgm:t>
-        <a:bodyPr/>
-        <a:lstStyle/>
-        <a:p>
-          <a:endParaRPr lang="en-US"/>
-        </a:p>
-      </dgm:t>
-    </dgm:pt>
-    <dgm:pt modelId="{D004D87C-D390-4BAA-B20D-69AF97599BD7}" type="pres">
-      <dgm:prSet presAssocID="{8EE144C8-20EA-43DA-B048-41CEE06807BC}" presName="space" presStyleCnt="0"/>
-      <dgm:spPr/>
-    </dgm:pt>
-    <dgm:pt modelId="{F9A125CB-F105-4A75-821B-0388D80248ED}" type="pres">
-      <dgm:prSet presAssocID="{2F8ECEAC-FAA3-4503-A169-57F41A503807}" presName="composite" presStyleCnt="0"/>
-      <dgm:spPr/>
-    </dgm:pt>
-    <dgm:pt modelId="{64DD6D48-227C-4434-BED8-F49C9D4F4F7E}" type="pres">
-      <dgm:prSet presAssocID="{2F8ECEAC-FAA3-4503-A169-57F41A503807}" presName="parTx" presStyleLbl="alignNode1" presStyleIdx="2" presStyleCnt="3">
-        <dgm:presLayoutVars>
-          <dgm:chMax val="0"/>
-          <dgm:chPref val="0"/>
-          <dgm:bulletEnabled val="1"/>
-        </dgm:presLayoutVars>
-      </dgm:prSet>
-      <dgm:spPr/>
-      <dgm:t>
-        <a:bodyPr/>
-        <a:lstStyle/>
-        <a:p>
-          <a:endParaRPr lang="en-US"/>
-        </a:p>
-      </dgm:t>
-    </dgm:pt>
-    <dgm:pt modelId="{98860936-C475-4184-9A9D-2F4B5D8B0BC7}" type="pres">
-      <dgm:prSet presAssocID="{2F8ECEAC-FAA3-4503-A169-57F41A503807}" presName="desTx" presStyleLbl="alignAccFollowNode1" presStyleIdx="2" presStyleCnt="3">
+      <dgm:prSet presAssocID="{184B56DA-A66C-4DD0-AE11-0A7EBA387E48}" presName="desTx" presStyleLbl="alignAccFollowNode1" presStyleIdx="1" presStyleCnt="2">
         <dgm:presLayoutVars>
           <dgm:bulletEnabled val="1"/>
         </dgm:presLayoutVars>
@@ -2984,17 +2874,13 @@
   </dgm:ptLst>
   <dgm:cxnLst>
     <dgm:cxn modelId="{9C3D3653-8462-4AAD-A961-3717216B9CF2}" type="presOf" srcId="{06F1FE2A-97BA-4B52-B3A6-E44D1F20CB28}" destId="{B8C15370-9E21-4343-A577-4985C41A0B6E}" srcOrd="0" destOrd="0" presId="urn:microsoft.com/office/officeart/2005/8/layout/hList1"/>
-    <dgm:cxn modelId="{4E402F4F-22AD-4214-BE8C-948F617ABB38}" type="presOf" srcId="{BB5A00DF-7368-4451-822A-C5213BEFEEBE}" destId="{98860936-C475-4184-9A9D-2F4B5D8B0BC7}" srcOrd="0" destOrd="0" presId="urn:microsoft.com/office/officeart/2005/8/layout/hList1"/>
     <dgm:cxn modelId="{31D0EEFF-9776-4597-8873-3B56F9091C86}" srcId="{184B56DA-A66C-4DD0-AE11-0A7EBA387E48}" destId="{17AF0C1B-AB46-4643-AAAB-C00D253E5731}" srcOrd="0" destOrd="0" parTransId="{29C3C336-A8CD-48B5-9F85-325299B52A84}" sibTransId="{631D11DF-11B6-487B-8148-E2BF1F9190AD}"/>
     <dgm:cxn modelId="{ACB965C6-1ACF-483C-9C29-8A17C949C706}" srcId="{06F1FE2A-97BA-4B52-B3A6-E44D1F20CB28}" destId="{4640F6E6-EF32-4372-9B3B-2FFD48F9CB5C}" srcOrd="0" destOrd="0" parTransId="{DB4F8E23-BBE6-4AB5-9D82-74F5115D7455}" sibTransId="{55E32D54-3DF3-4F3F-B3B8-1AEE5606EC62}"/>
     <dgm:cxn modelId="{51EFA3EF-F9E3-4B84-BA84-84A3BBF4D4D3}" type="presOf" srcId="{17AF0C1B-AB46-4643-AAAB-C00D253E5731}" destId="{6EC96761-7A7E-46B1-9A31-B92F49834D5A}" srcOrd="0" destOrd="0" presId="urn:microsoft.com/office/officeart/2005/8/layout/hList1"/>
-    <dgm:cxn modelId="{3F455948-84CC-4BD3-B122-BC7FC520F6C2}" srcId="{2F8ECEAC-FAA3-4503-A169-57F41A503807}" destId="{BB5A00DF-7368-4451-822A-C5213BEFEEBE}" srcOrd="0" destOrd="0" parTransId="{DBF05790-03E0-47D4-8137-1ED35487613F}" sibTransId="{1FC1A5B2-F57F-4D1D-AD7C-59801453B2A1}"/>
-    <dgm:cxn modelId="{9BA84549-343A-497A-8F50-EA4C874AF4DD}" type="presOf" srcId="{2F8ECEAC-FAA3-4503-A169-57F41A503807}" destId="{64DD6D48-227C-4434-BED8-F49C9D4F4F7E}" srcOrd="0" destOrd="0" presId="urn:microsoft.com/office/officeart/2005/8/layout/hList1"/>
     <dgm:cxn modelId="{913323B4-1F88-4AC5-8C9E-BE0572C8023B}" type="presOf" srcId="{4640F6E6-EF32-4372-9B3B-2FFD48F9CB5C}" destId="{DE65B54D-BB89-4898-B770-68834B90CB27}" srcOrd="0" destOrd="0" presId="urn:microsoft.com/office/officeart/2005/8/layout/hList1"/>
     <dgm:cxn modelId="{FC6EE199-23CF-4307-94F8-FC53916EA51A}" srcId="{425AB2E9-3568-4939-AD20-F42726F09D02}" destId="{06F1FE2A-97BA-4B52-B3A6-E44D1F20CB28}" srcOrd="0" destOrd="0" parTransId="{272155B6-483B-4675-B173-D3F00A201046}" sibTransId="{0CACD921-34CA-4681-87F1-041A98C27B3D}"/>
     <dgm:cxn modelId="{7FD88FF9-53A7-4C08-9686-37472D3C5F90}" type="presOf" srcId="{184B56DA-A66C-4DD0-AE11-0A7EBA387E48}" destId="{E01B3154-0666-4584-9FC4-432DE00CC402}" srcOrd="0" destOrd="0" presId="urn:microsoft.com/office/officeart/2005/8/layout/hList1"/>
     <dgm:cxn modelId="{01AD485A-0916-4A80-9CBA-29870F4D202A}" srcId="{425AB2E9-3568-4939-AD20-F42726F09D02}" destId="{184B56DA-A66C-4DD0-AE11-0A7EBA387E48}" srcOrd="1" destOrd="0" parTransId="{3C1C544F-4C0C-4E19-A3D2-C3E5175D7B4B}" sibTransId="{8EE144C8-20EA-43DA-B048-41CEE06807BC}"/>
-    <dgm:cxn modelId="{24836079-9FDA-4F84-9291-518671EE6E30}" srcId="{425AB2E9-3568-4939-AD20-F42726F09D02}" destId="{2F8ECEAC-FAA3-4503-A169-57F41A503807}" srcOrd="2" destOrd="0" parTransId="{ACAA3BC8-2CDA-42A5-8DD6-5A948ACC6FCF}" sibTransId="{61A568BF-D1AB-4345-9CA7-878468CAA9E0}"/>
     <dgm:cxn modelId="{12E1A9E1-0E2B-4599-8D03-2A69A1547115}" type="presOf" srcId="{425AB2E9-3568-4939-AD20-F42726F09D02}" destId="{4351CFC8-37EC-494B-A841-287649776134}" srcOrd="0" destOrd="0" presId="urn:microsoft.com/office/officeart/2005/8/layout/hList1"/>
     <dgm:cxn modelId="{AE41C4D7-1708-49AF-AE4A-683C8CF513D4}" type="presParOf" srcId="{4351CFC8-37EC-494B-A841-287649776134}" destId="{70E9962D-05C5-4F85-A473-03B50B9C6416}" srcOrd="0" destOrd="0" presId="urn:microsoft.com/office/officeart/2005/8/layout/hList1"/>
     <dgm:cxn modelId="{54821AC3-B761-4DE3-A299-35C839B48BE7}" type="presParOf" srcId="{70E9962D-05C5-4F85-A473-03B50B9C6416}" destId="{B8C15370-9E21-4343-A577-4985C41A0B6E}" srcOrd="0" destOrd="0" presId="urn:microsoft.com/office/officeart/2005/8/layout/hList1"/>
@@ -3003,10 +2889,6 @@
     <dgm:cxn modelId="{54851ACF-12A9-4433-874C-444142834581}" type="presParOf" srcId="{4351CFC8-37EC-494B-A841-287649776134}" destId="{C25D5A66-A92F-4D7D-A84B-534F27779317}" srcOrd="2" destOrd="0" presId="urn:microsoft.com/office/officeart/2005/8/layout/hList1"/>
     <dgm:cxn modelId="{868B21E6-351E-4088-8823-CA0673B273DE}" type="presParOf" srcId="{C25D5A66-A92F-4D7D-A84B-534F27779317}" destId="{E01B3154-0666-4584-9FC4-432DE00CC402}" srcOrd="0" destOrd="0" presId="urn:microsoft.com/office/officeart/2005/8/layout/hList1"/>
     <dgm:cxn modelId="{91B14886-054D-49EB-AF4F-06F73F4E851C}" type="presParOf" srcId="{C25D5A66-A92F-4D7D-A84B-534F27779317}" destId="{6EC96761-7A7E-46B1-9A31-B92F49834D5A}" srcOrd="1" destOrd="0" presId="urn:microsoft.com/office/officeart/2005/8/layout/hList1"/>
-    <dgm:cxn modelId="{68DB7211-B7EA-4286-B920-F0E227605505}" type="presParOf" srcId="{4351CFC8-37EC-494B-A841-287649776134}" destId="{D004D87C-D390-4BAA-B20D-69AF97599BD7}" srcOrd="3" destOrd="0" presId="urn:microsoft.com/office/officeart/2005/8/layout/hList1"/>
-    <dgm:cxn modelId="{10B5F44C-3CDA-48E6-B908-B6A9CE97492E}" type="presParOf" srcId="{4351CFC8-37EC-494B-A841-287649776134}" destId="{F9A125CB-F105-4A75-821B-0388D80248ED}" srcOrd="4" destOrd="0" presId="urn:microsoft.com/office/officeart/2005/8/layout/hList1"/>
-    <dgm:cxn modelId="{82B6102B-62E6-40B9-9BD7-E73770A2464A}" type="presParOf" srcId="{F9A125CB-F105-4A75-821B-0388D80248ED}" destId="{64DD6D48-227C-4434-BED8-F49C9D4F4F7E}" srcOrd="0" destOrd="0" presId="urn:microsoft.com/office/officeart/2005/8/layout/hList1"/>
-    <dgm:cxn modelId="{5D5C143C-31FC-4B5B-97EA-AB78A00ACAA1}" type="presParOf" srcId="{F9A125CB-F105-4A75-821B-0388D80248ED}" destId="{98860936-C475-4184-9A9D-2F4B5D8B0BC7}" srcOrd="1" destOrd="0" presId="urn:microsoft.com/office/officeart/2005/8/layout/hList1"/>
   </dgm:cxnLst>
   <dgm:bg/>
   <dgm:whole/>
@@ -3504,7 +3386,7 @@
           </a:blip>
           <a:srcRect/>
           <a:stretch>
-            <a:fillRect/>
+            <a:fillRect l="-21000" r="-21000"/>
           </a:stretch>
         </a:blipFill>
       </dgm:spPr>
@@ -3515,11 +3397,7 @@
           <a:endParaRPr lang="en-US"/>
         </a:p>
       </dgm:t>
-      <dgm:extLst>
-        <a:ext uri="{E40237B7-FDA0-4F09-8148-C483321AD2D9}">
-          <dgm14:cNvPr xmlns:dgm14="http://schemas.microsoft.com/office/drawing/2010/diagram" id="0" name="" descr="Stack of file folders and papers with pen on top." title="Sample Picture"/>
-        </a:ext>
-      </dgm:extLst>
+      <dgm:extLst/>
     </dgm:pt>
     <dgm:pt modelId="{5ABBC393-AD16-4772-8402-4ABCB8683B4E}" type="pres">
       <dgm:prSet presAssocID="{A518A75D-9854-4CDE-9FB7-B1EBB324AAED}" presName="Child" presStyleLbl="revTx" presStyleIdx="0" presStyleCnt="4">
@@ -3567,7 +3445,7 @@
       <dgm:prSet presAssocID="{25AF84C7-6ED7-450C-83EA-4337CE735A70}" presName="Image" presStyleLbl="node1" presStyleIdx="1" presStyleCnt="4"/>
       <dgm:spPr>
         <a:blipFill>
-          <a:blip xmlns:r="http://schemas.openxmlformats.org/officeDocument/2006/relationships" r:embed="rId2" cstate="print">
+          <a:blip xmlns:r="http://schemas.openxmlformats.org/officeDocument/2006/relationships" r:embed="rId2">
             <a:extLst>
               <a:ext uri="{28A0092B-C50C-407E-A947-70E740481C1C}">
                 <a14:useLocalDpi xmlns:a14="http://schemas.microsoft.com/office/drawing/2010/main" val="0"/>
@@ -3576,7 +3454,7 @@
           </a:blip>
           <a:srcRect/>
           <a:stretch>
-            <a:fillRect/>
+            <a:fillRect t="-8000" b="-8000"/>
           </a:stretch>
         </a:blipFill>
       </dgm:spPr>
@@ -3587,11 +3465,7 @@
           <a:endParaRPr lang="en-US"/>
         </a:p>
       </dgm:t>
-      <dgm:extLst>
-        <a:ext uri="{E40237B7-FDA0-4F09-8148-C483321AD2D9}">
-          <dgm14:cNvPr xmlns:dgm14="http://schemas.microsoft.com/office/drawing/2010/diagram" id="0" name="" descr="Four people having a discussion in office with large windows." title="Sample Picture"/>
-        </a:ext>
-      </dgm:extLst>
+      <dgm:extLst/>
     </dgm:pt>
     <dgm:pt modelId="{A0810939-5D65-4F5C-894F-F86C706A7A1C}" type="pres">
       <dgm:prSet presAssocID="{25AF84C7-6ED7-450C-83EA-4337CE735A70}" presName="Child" presStyleLbl="revTx" presStyleIdx="1" presStyleCnt="4">
@@ -3636,10 +3510,10 @@
       <dgm:spPr/>
     </dgm:pt>
     <dgm:pt modelId="{6FDEA8A3-BC3B-493E-88CC-A57435CCDC96}" type="pres">
-      <dgm:prSet presAssocID="{0F8DBA57-A3BA-4BC9-A853-67B71E3B3531}" presName="Image" presStyleLbl="node1" presStyleIdx="2" presStyleCnt="4"/>
+      <dgm:prSet presAssocID="{0F8DBA57-A3BA-4BC9-A853-67B71E3B3531}" presName="Image" presStyleLbl="node1" presStyleIdx="2" presStyleCnt="4" custScaleX="79988" custScaleY="84190" custLinFactNeighborX="3024" custLinFactNeighborY="-5274"/>
       <dgm:spPr>
         <a:blipFill>
-          <a:blip xmlns:r="http://schemas.openxmlformats.org/officeDocument/2006/relationships" r:embed="rId3" cstate="print">
+          <a:blip xmlns:r="http://schemas.openxmlformats.org/officeDocument/2006/relationships" r:embed="rId3">
             <a:extLst>
               <a:ext uri="{28A0092B-C50C-407E-A947-70E740481C1C}">
                 <a14:useLocalDpi xmlns:a14="http://schemas.microsoft.com/office/drawing/2010/main" val="0"/>
@@ -3648,7 +3522,7 @@
           </a:blip>
           <a:srcRect/>
           <a:stretch>
-            <a:fillRect/>
+            <a:fillRect t="-6000" b="-6000"/>
           </a:stretch>
         </a:blipFill>
       </dgm:spPr>
@@ -3659,11 +3533,7 @@
           <a:endParaRPr lang="en-US"/>
         </a:p>
       </dgm:t>
-      <dgm:extLst>
-        <a:ext uri="{E40237B7-FDA0-4F09-8148-C483321AD2D9}">
-          <dgm14:cNvPr xmlns:dgm14="http://schemas.microsoft.com/office/drawing/2010/diagram" id="0" name="" descr="Close up of students studying in library." title="Sample Picture"/>
-        </a:ext>
-      </dgm:extLst>
+      <dgm:extLst/>
     </dgm:pt>
     <dgm:pt modelId="{EBE06ADE-C892-44D3-AB90-0EE941CCA21D}" type="pres">
       <dgm:prSet presAssocID="{0F8DBA57-A3BA-4BC9-A853-67B71E3B3531}" presName="Child" presStyleLbl="revTx" presStyleIdx="2" presStyleCnt="4">
@@ -3708,10 +3578,10 @@
       <dgm:spPr/>
     </dgm:pt>
     <dgm:pt modelId="{D5EF084B-0048-459A-9001-2451F5192F25}" type="pres">
-      <dgm:prSet presAssocID="{677FC8B7-2875-43E9-9CDF-1CB72AAB0D0E}" presName="Image" presStyleLbl="node1" presStyleIdx="3" presStyleCnt="4"/>
+      <dgm:prSet presAssocID="{677FC8B7-2875-43E9-9CDF-1CB72AAB0D0E}" presName="Image" presStyleLbl="node1" presStyleIdx="3" presStyleCnt="4" custScaleX="90520" custScaleY="88437" custLinFactNeighborY="-1416"/>
       <dgm:spPr>
         <a:blipFill>
-          <a:blip xmlns:r="http://schemas.openxmlformats.org/officeDocument/2006/relationships" r:embed="rId4" cstate="print">
+          <a:blip xmlns:r="http://schemas.openxmlformats.org/officeDocument/2006/relationships" r:embed="rId4">
             <a:extLst>
               <a:ext uri="{28A0092B-C50C-407E-A947-70E740481C1C}">
                 <a14:useLocalDpi xmlns:a14="http://schemas.microsoft.com/office/drawing/2010/main" val="0"/>
@@ -3720,7 +3590,7 @@
           </a:blip>
           <a:srcRect/>
           <a:stretch>
-            <a:fillRect/>
+            <a:fillRect l="-19000" r="-19000"/>
           </a:stretch>
         </a:blipFill>
       </dgm:spPr>
@@ -3731,11 +3601,7 @@
           <a:endParaRPr lang="en-US"/>
         </a:p>
       </dgm:t>
-      <dgm:extLst>
-        <a:ext uri="{E40237B7-FDA0-4F09-8148-C483321AD2D9}">
-          <dgm14:cNvPr xmlns:dgm14="http://schemas.microsoft.com/office/drawing/2010/diagram" id="0" name="" descr="Closeup of gloved hand picking up a glass beaker." title="Sample Picture"/>
-        </a:ext>
-      </dgm:extLst>
+      <dgm:extLst/>
     </dgm:pt>
     <dgm:pt modelId="{2A1C86DE-9AB9-421D-8408-47DA191A0168}" type="pres">
       <dgm:prSet presAssocID="{677FC8B7-2875-43E9-9CDF-1CB72AAB0D0E}" presName="Child" presStyleLbl="revTx" presStyleIdx="3" presStyleCnt="4">
@@ -3843,8 +3709,8 @@
       </dsp:nvSpPr>
       <dsp:spPr>
         <a:xfrm>
-          <a:off x="4000" y="1441371"/>
-          <a:ext cx="3900487" cy="1560194"/>
+          <a:off x="62" y="1285468"/>
+          <a:ext cx="5981997" cy="1872000"/>
         </a:xfrm>
         <a:prstGeom prst="rect">
           <a:avLst/>
@@ -3910,8 +3776,8 @@
         </a:p>
       </dsp:txBody>
       <dsp:txXfrm>
-        <a:off x="4000" y="1441371"/>
-        <a:ext cx="3900487" cy="1560194"/>
+        <a:off x="62" y="1285468"/>
+        <a:ext cx="5981997" cy="1872000"/>
       </dsp:txXfrm>
     </dsp:sp>
     <dsp:sp modelId="{DE65B54D-BB89-4898-B770-68834B90CB27}">
@@ -3921,8 +3787,8 @@
       </dsp:nvSpPr>
       <dsp:spPr>
         <a:xfrm>
-          <a:off x="4000" y="3001565"/>
-          <a:ext cx="3900487" cy="2854800"/>
+          <a:off x="62" y="3157468"/>
+          <a:ext cx="5981997" cy="2854800"/>
         </a:xfrm>
         <a:prstGeom prst="rect">
           <a:avLst/>
@@ -3984,14 +3850,15 @@
             <a:buChar char="••"/>
           </a:pPr>
           <a:r>
-            <a:rPr lang="en-US" sz="2800" kern="1200" dirty="0"/>
-            <a:t>State what they will use the  system for</a:t>
+            <a:rPr lang="en-US" sz="2800" kern="1200" dirty="0" smtClean="0"/>
+            <a:t>Farmers will be able to carry out crop production throughout the year without the worry of weather and climatic changes.</a:t>
           </a:r>
+          <a:endParaRPr lang="en-US" sz="2800" kern="1200" dirty="0"/>
         </a:p>
       </dsp:txBody>
       <dsp:txXfrm>
-        <a:off x="4000" y="3001565"/>
-        <a:ext cx="3900487" cy="2854800"/>
+        <a:off x="62" y="3157468"/>
+        <a:ext cx="5981997" cy="2854800"/>
       </dsp:txXfrm>
     </dsp:sp>
     <dsp:sp modelId="{E01B3154-0666-4584-9FC4-432DE00CC402}">
@@ -4001,8 +3868,8 @@
       </dsp:nvSpPr>
       <dsp:spPr>
         <a:xfrm>
-          <a:off x="4450556" y="1441371"/>
-          <a:ext cx="3900487" cy="1560194"/>
+          <a:off x="6819539" y="1285468"/>
+          <a:ext cx="5981997" cy="1872000"/>
         </a:xfrm>
         <a:prstGeom prst="rect">
           <a:avLst/>
@@ -4068,8 +3935,8 @@
         </a:p>
       </dsp:txBody>
       <dsp:txXfrm>
-        <a:off x="4450556" y="1441371"/>
-        <a:ext cx="3900487" cy="1560194"/>
+        <a:off x="6819539" y="1285468"/>
+        <a:ext cx="5981997" cy="1872000"/>
       </dsp:txXfrm>
     </dsp:sp>
     <dsp:sp modelId="{6EC96761-7A7E-46B1-9A31-B92F49834D5A}">
@@ -4079,8 +3946,8 @@
       </dsp:nvSpPr>
       <dsp:spPr>
         <a:xfrm>
-          <a:off x="4450556" y="3001565"/>
-          <a:ext cx="3900487" cy="2854800"/>
+          <a:off x="6819539" y="3157468"/>
+          <a:ext cx="5981997" cy="2854800"/>
         </a:xfrm>
         <a:prstGeom prst="rect">
           <a:avLst/>
@@ -4142,171 +4009,15 @@
             <a:buChar char="••"/>
           </a:pPr>
           <a:r>
-            <a:rPr lang="en-US" sz="2800" kern="1200" dirty="0"/>
-            <a:t>State what they will use the  system for</a:t>
+            <a:rPr lang="en-US" sz="2800" kern="1200" dirty="0" smtClean="0"/>
+            <a:t>Plant researchers will use the data stored in the database to know which kind of plants grow better under what kind of conditions and make insightful predictions.</a:t>
           </a:r>
+          <a:endParaRPr lang="en-US" sz="2800" kern="1200" dirty="0"/>
         </a:p>
       </dsp:txBody>
       <dsp:txXfrm>
-        <a:off x="4450556" y="3001565"/>
-        <a:ext cx="3900487" cy="2854800"/>
-      </dsp:txXfrm>
-    </dsp:sp>
-    <dsp:sp modelId="{64DD6D48-227C-4434-BED8-F49C9D4F4F7E}">
-      <dsp:nvSpPr>
-        <dsp:cNvPr id="0" name=""/>
-        <dsp:cNvSpPr/>
-      </dsp:nvSpPr>
-      <dsp:spPr>
-        <a:xfrm>
-          <a:off x="8897112" y="1441371"/>
-          <a:ext cx="3900487" cy="1560194"/>
-        </a:xfrm>
-        <a:prstGeom prst="rect">
-          <a:avLst/>
-        </a:prstGeom>
-        <a:solidFill>
-          <a:schemeClr val="accent1">
-            <a:hueOff val="0"/>
-            <a:satOff val="0"/>
-            <a:lumOff val="0"/>
-            <a:alphaOff val="0"/>
-          </a:schemeClr>
-        </a:solidFill>
-        <a:ln w="12700" cap="flat" cmpd="sng" algn="ctr">
-          <a:solidFill>
-            <a:schemeClr val="accent1">
-              <a:hueOff val="0"/>
-              <a:satOff val="0"/>
-              <a:lumOff val="0"/>
-              <a:alphaOff val="0"/>
-            </a:schemeClr>
-          </a:solidFill>
-          <a:prstDash val="solid"/>
-          <a:miter lim="800000"/>
-        </a:ln>
-        <a:effectLst/>
-      </dsp:spPr>
-      <dsp:style>
-        <a:lnRef idx="2">
-          <a:scrgbClr r="0" g="0" b="0"/>
-        </a:lnRef>
-        <a:fillRef idx="1">
-          <a:scrgbClr r="0" g="0" b="0"/>
-        </a:fillRef>
-        <a:effectRef idx="0">
-          <a:scrgbClr r="0" g="0" b="0"/>
-        </a:effectRef>
-        <a:fontRef idx="minor">
-          <a:schemeClr val="lt1"/>
-        </a:fontRef>
-      </dsp:style>
-      <dsp:txBody>
-        <a:bodyPr spcFirstLastPara="0" vert="horz" wrap="square" lIns="199136" tIns="113792" rIns="199136" bIns="113792" numCol="1" spcCol="1270" anchor="ctr" anchorCtr="0">
-          <a:noAutofit/>
-        </a:bodyPr>
-        <a:lstStyle/>
-        <a:p>
-          <a:pPr lvl="0" algn="ctr" defTabSz="1244600">
-            <a:lnSpc>
-              <a:spcPct val="90000"/>
-            </a:lnSpc>
-            <a:spcBef>
-              <a:spcPct val="0"/>
-            </a:spcBef>
-            <a:spcAft>
-              <a:spcPct val="35000"/>
-            </a:spcAft>
-          </a:pPr>
-          <a:r>
-            <a:rPr lang="en-US" sz="2800" kern="1200" dirty="0"/>
-            <a:t>User category xx</a:t>
-          </a:r>
-        </a:p>
-      </dsp:txBody>
-      <dsp:txXfrm>
-        <a:off x="8897112" y="1441371"/>
-        <a:ext cx="3900487" cy="1560194"/>
-      </dsp:txXfrm>
-    </dsp:sp>
-    <dsp:sp modelId="{98860936-C475-4184-9A9D-2F4B5D8B0BC7}">
-      <dsp:nvSpPr>
-        <dsp:cNvPr id="0" name=""/>
-        <dsp:cNvSpPr/>
-      </dsp:nvSpPr>
-      <dsp:spPr>
-        <a:xfrm>
-          <a:off x="8897112" y="3001565"/>
-          <a:ext cx="3900487" cy="2854800"/>
-        </a:xfrm>
-        <a:prstGeom prst="rect">
-          <a:avLst/>
-        </a:prstGeom>
-        <a:solidFill>
-          <a:schemeClr val="accent1">
-            <a:alpha val="90000"/>
-            <a:tint val="40000"/>
-            <a:hueOff val="0"/>
-            <a:satOff val="0"/>
-            <a:lumOff val="0"/>
-            <a:alphaOff val="0"/>
-          </a:schemeClr>
-        </a:solidFill>
-        <a:ln w="12700" cap="flat" cmpd="sng" algn="ctr">
-          <a:solidFill>
-            <a:schemeClr val="accent1">
-              <a:alpha val="90000"/>
-              <a:tint val="40000"/>
-              <a:hueOff val="0"/>
-              <a:satOff val="0"/>
-              <a:lumOff val="0"/>
-              <a:alphaOff val="0"/>
-            </a:schemeClr>
-          </a:solidFill>
-          <a:prstDash val="solid"/>
-          <a:miter lim="800000"/>
-        </a:ln>
-        <a:effectLst/>
-      </dsp:spPr>
-      <dsp:style>
-        <a:lnRef idx="2">
-          <a:scrgbClr r="0" g="0" b="0"/>
-        </a:lnRef>
-        <a:fillRef idx="1">
-          <a:scrgbClr r="0" g="0" b="0"/>
-        </a:fillRef>
-        <a:effectRef idx="0">
-          <a:scrgbClr r="0" g="0" b="0"/>
-        </a:effectRef>
-        <a:fontRef idx="minor"/>
-      </dsp:style>
-      <dsp:txBody>
-        <a:bodyPr spcFirstLastPara="0" vert="horz" wrap="square" lIns="149352" tIns="149352" rIns="199136" bIns="224028" numCol="1" spcCol="1270" anchor="t" anchorCtr="0">
-          <a:noAutofit/>
-        </a:bodyPr>
-        <a:lstStyle/>
-        <a:p>
-          <a:pPr marL="285750" lvl="1" indent="-285750" algn="l" defTabSz="1244600">
-            <a:lnSpc>
-              <a:spcPct val="90000"/>
-            </a:lnSpc>
-            <a:spcBef>
-              <a:spcPct val="0"/>
-            </a:spcBef>
-            <a:spcAft>
-              <a:spcPct val="15000"/>
-            </a:spcAft>
-            <a:buChar char="••"/>
-          </a:pPr>
-          <a:r>
-            <a:rPr lang="en-US" sz="2800" kern="1200" dirty="0"/>
-            <a:t>State what they will use the  system for</a:t>
-          </a:r>
-        </a:p>
-      </dsp:txBody>
-      <dsp:txXfrm>
-        <a:off x="8897112" y="3001565"/>
-        <a:ext cx="3900487" cy="2854800"/>
+        <a:off x="6819539" y="3157468"/>
+        <a:ext cx="5981997" cy="2854800"/>
       </dsp:txXfrm>
     </dsp:sp>
   </dsp:spTree>
@@ -4393,7 +4104,7 @@
           </a:blip>
           <a:srcRect/>
           <a:stretch>
-            <a:fillRect/>
+            <a:fillRect l="-21000" r="-21000"/>
           </a:stretch>
         </a:blipFill>
         <a:ln w="12700" cap="flat" cmpd="sng" algn="ctr">
@@ -4698,7 +4409,7 @@
           <a:avLst/>
         </a:prstGeom>
         <a:blipFill>
-          <a:blip xmlns:r="http://schemas.openxmlformats.org/officeDocument/2006/relationships" r:embed="rId2" cstate="print">
+          <a:blip xmlns:r="http://schemas.openxmlformats.org/officeDocument/2006/relationships" r:embed="rId2">
             <a:extLst>
               <a:ext uri="{28A0092B-C50C-407E-A947-70E740481C1C}">
                 <a14:useLocalDpi xmlns:a14="http://schemas.microsoft.com/office/drawing/2010/main" val="0"/>
@@ -4707,7 +4418,7 @@
           </a:blip>
           <a:srcRect/>
           <a:stretch>
-            <a:fillRect/>
+            <a:fillRect t="-8000" b="-8000"/>
           </a:stretch>
         </a:blipFill>
         <a:ln w="12700" cap="flat" cmpd="sng" algn="ctr">
@@ -4932,14 +4643,14 @@
       </dsp:nvSpPr>
       <dsp:spPr>
         <a:xfrm>
-          <a:off x="6808237" y="1276659"/>
-          <a:ext cx="2648948" cy="2266450"/>
+          <a:off x="7153395" y="1336290"/>
+          <a:ext cx="2118841" cy="1908124"/>
         </a:xfrm>
         <a:prstGeom prst="rect">
           <a:avLst/>
         </a:prstGeom>
         <a:blipFill>
-          <a:blip xmlns:r="http://schemas.openxmlformats.org/officeDocument/2006/relationships" r:embed="rId3" cstate="print">
+          <a:blip xmlns:r="http://schemas.openxmlformats.org/officeDocument/2006/relationships" r:embed="rId3">
             <a:extLst>
               <a:ext uri="{28A0092B-C50C-407E-A947-70E740481C1C}">
                 <a14:useLocalDpi xmlns:a14="http://schemas.microsoft.com/office/drawing/2010/main" val="0"/>
@@ -4948,7 +4659,7 @@
           </a:blip>
           <a:srcRect/>
           <a:stretch>
-            <a:fillRect/>
+            <a:fillRect t="-6000" b="-6000"/>
           </a:stretch>
         </a:blipFill>
         <a:ln w="12700" cap="flat" cmpd="sng" algn="ctr">
@@ -5172,14 +4883,14 @@
       </dsp:nvSpPr>
       <dsp:spPr>
         <a:xfrm>
-          <a:off x="10141391" y="1276659"/>
-          <a:ext cx="2648948" cy="2266450"/>
+          <a:off x="10266951" y="1375601"/>
+          <a:ext cx="2397828" cy="2004380"/>
         </a:xfrm>
         <a:prstGeom prst="rect">
           <a:avLst/>
         </a:prstGeom>
         <a:blipFill>
-          <a:blip xmlns:r="http://schemas.openxmlformats.org/officeDocument/2006/relationships" r:embed="rId4" cstate="print">
+          <a:blip xmlns:r="http://schemas.openxmlformats.org/officeDocument/2006/relationships" r:embed="rId4">
             <a:extLst>
               <a:ext uri="{28A0092B-C50C-407E-A947-70E740481C1C}">
                 <a14:useLocalDpi xmlns:a14="http://schemas.microsoft.com/office/drawing/2010/main" val="0"/>
@@ -5188,7 +4899,7 @@
           </a:blip>
           <a:srcRect/>
           <a:stretch>
-            <a:fillRect/>
+            <a:fillRect l="-19000" r="-19000"/>
           </a:stretch>
         </a:blipFill>
         <a:ln w="12700" cap="flat" cmpd="sng" algn="ctr">
@@ -12657,7 +12368,7 @@
         </p:spPr>
         <p:txBody>
           <a:bodyPr>
-            <a:normAutofit fontScale="77500" lnSpcReduction="20000"/>
+            <a:normAutofit fontScale="70000" lnSpcReduction="20000"/>
           </a:bodyPr>
           <a:lstStyle/>
           <a:p>
@@ -12759,7 +12470,15 @@
             </a:pPr>
             <a:r>
               <a:rPr lang="en-US" dirty="0" smtClean="0"/>
-              <a:t>The system must turn on the funs when the temperature or humidity levels are above </a:t>
+              <a:t>The system must turn on the </a:t>
+            </a:r>
+            <a:r>
+              <a:rPr lang="en-US" dirty="0" smtClean="0"/>
+              <a:t>fans </a:t>
+            </a:r>
+            <a:r>
+              <a:rPr lang="en-US" dirty="0" smtClean="0"/>
+              <a:t>when the temperature or humidity levels are above </a:t>
             </a:r>
             <a:r>
               <a:rPr lang="en-US" dirty="0"/>
@@ -12778,10 +12497,47 @@
             </a:r>
           </a:p>
           <a:p>
+            <a:pPr lvl="1">
+              <a:buFont typeface="Wingdings" pitchFamily="2" charset="2"/>
+              <a:buChar char="Ø"/>
+            </a:pPr>
             <a:r>
               <a:rPr lang="en-US" dirty="0" smtClean="0"/>
-              <a:t>0</a:t>
-            </a:r>
+              <a:t>It must be scalable</a:t>
+            </a:r>
+          </a:p>
+          <a:p>
+            <a:pPr lvl="1">
+              <a:buFont typeface="Wingdings" pitchFamily="2" charset="2"/>
+              <a:buChar char="Ø"/>
+            </a:pPr>
+            <a:r>
+              <a:rPr lang="en-US" dirty="0" smtClean="0"/>
+              <a:t>It must be safe</a:t>
+            </a:r>
+          </a:p>
+          <a:p>
+            <a:pPr lvl="1">
+              <a:buFont typeface="Wingdings" pitchFamily="2" charset="2"/>
+              <a:buChar char="Ø"/>
+            </a:pPr>
+            <a:r>
+              <a:rPr lang="en-US" dirty="0" smtClean="0"/>
+              <a:t>It must be maintainable</a:t>
+            </a:r>
+          </a:p>
+          <a:p>
+            <a:pPr lvl="1">
+              <a:buFont typeface="Wingdings" pitchFamily="2" charset="2"/>
+              <a:buChar char="Ø"/>
+            </a:pPr>
+            <a:r>
+              <a:rPr lang="en-US" dirty="0" smtClean="0"/>
+              <a:t>It must be testable and debuggable</a:t>
+            </a:r>
+          </a:p>
+          <a:p>
+            <a:endParaRPr lang="en-US" dirty="0" smtClean="0"/>
           </a:p>
         </p:txBody>
       </p:sp>
@@ -12822,7 +12578,7 @@
             <p:ph sz="quarter" idx="26"/>
             <p:extLst>
               <p:ext uri="{D42A27DB-BD31-4B8C-83A1-F6EECF244321}">
-                <p14:modId xmlns:p14="http://schemas.microsoft.com/office/powerpoint/2010/main" val="1697911412"/>
+                <p14:modId xmlns:p14="http://schemas.microsoft.com/office/powerpoint/2010/main" val="888645605"/>
               </p:ext>
             </p:extLst>
           </p:nvPr>
@@ -12891,7 +12647,7 @@
             <p:ph sz="quarter" idx="23"/>
             <p:extLst>
               <p:ext uri="{D42A27DB-BD31-4B8C-83A1-F6EECF244321}">
-                <p14:modId xmlns:p14="http://schemas.microsoft.com/office/powerpoint/2010/main" val="4101191967"/>
+                <p14:modId xmlns:p14="http://schemas.microsoft.com/office/powerpoint/2010/main" val="1374716787"/>
               </p:ext>
             </p:extLst>
           </p:nvPr>
@@ -13012,45 +12768,6 @@
       </p:graphicFrame>
       <p:sp>
         <p:nvSpPr>
-          <p:cNvPr id="6" name="Content Placeholder 5"/>
-          <p:cNvSpPr>
-            <a:spLocks noGrp="1"/>
-          </p:cNvSpPr>
-          <p:nvPr>
-            <p:ph sz="quarter" idx="33"/>
-          </p:nvPr>
-        </p:nvSpPr>
-        <p:spPr/>
-        <p:txBody>
-          <a:bodyPr/>
-          <a:lstStyle/>
-          <a:p>
-            <a:r>
-              <a:rPr lang="en-US" dirty="0"/>
-              <a:t>Include key screenshots of your system and </a:t>
-            </a:r>
-            <a:r>
-              <a:rPr lang="en-US" dirty="0" err="1"/>
-              <a:t>visualisations</a:t>
-            </a:r>
-            <a:endParaRPr lang="en-US" dirty="0"/>
-          </a:p>
-          <a:p>
-            <a:r>
-              <a:rPr lang="en-US" dirty="0"/>
-              <a:t>Result 2</a:t>
-            </a:r>
-          </a:p>
-          <a:p>
-            <a:r>
-              <a:rPr lang="en-US" dirty="0"/>
-              <a:t>Result 3</a:t>
-            </a:r>
-          </a:p>
-        </p:txBody>
-      </p:sp>
-      <p:sp>
-        <p:nvSpPr>
           <p:cNvPr id="71" name="Text Placeholder 70"/>
           <p:cNvSpPr>
             <a:spLocks noGrp="1"/>
@@ -13087,15 +12804,16 @@
           <a:lstStyle/>
           <a:p>
             <a:r>
-              <a:rPr lang="en-US" dirty="0"/>
-              <a:t>Brief summary of what you discovered based on results</a:t>
-            </a:r>
-          </a:p>
-          <a:p>
-            <a:r>
-              <a:rPr lang="en-US" dirty="0"/>
-              <a:t>Indicate and explain whether or not the data supports your hypothesis</a:t>
-            </a:r>
+              <a:rPr lang="en-US" dirty="0" smtClean="0"/>
+              <a:t>Temperature, moisture, light, and humidity  sensors will be used  in  the project  to give the exact values of the parameters.</a:t>
+            </a:r>
+          </a:p>
+          <a:p>
+            <a:r>
+              <a:rPr lang="en-US" dirty="0" smtClean="0"/>
+              <a:t>The moisture sensor  gave the correct result  according to the soil condition and the results can be seen on the web page.</a:t>
+            </a:r>
+            <a:endParaRPr lang="en-US" dirty="0"/>
           </a:p>
         </p:txBody>
       </p:sp>
@@ -13131,15 +12849,175 @@
             <p:ph sz="quarter" idx="35"/>
           </p:nvPr>
         </p:nvSpPr>
-        <p:spPr/>
+        <p:spPr>
+          <a:xfrm>
+            <a:off x="29805330" y="27166824"/>
+            <a:ext cx="12897150" cy="4939918"/>
+          </a:xfrm>
+        </p:spPr>
         <p:txBody>
-          <a:bodyPr/>
+          <a:bodyPr>
+            <a:normAutofit fontScale="40000" lnSpcReduction="20000"/>
+          </a:bodyPr>
           <a:lstStyle/>
           <a:p>
             <a:r>
-              <a:rPr lang="en-US"/>
-              <a:t>Include print and electronic sources in alphabetical order</a:t>
-            </a:r>
+              <a:rPr lang="en-US" dirty="0"/>
+              <a:t>[1] W. P. </a:t>
+            </a:r>
+            <a:r>
+              <a:rPr lang="en-US" dirty="0" smtClean="0"/>
+              <a:t>Review, Uganda </a:t>
+            </a:r>
+            <a:r>
+              <a:rPr lang="en-US" dirty="0"/>
+              <a:t>population </a:t>
+            </a:r>
+            <a:r>
+              <a:rPr lang="en-US" dirty="0" smtClean="0"/>
+              <a:t>2019,http</a:t>
+            </a:r>
+            <a:r>
+              <a:rPr lang="en-US" dirty="0"/>
+              <a:t>://</a:t>
+            </a:r>
+            <a:r>
+              <a:rPr lang="en-US" dirty="0" smtClean="0"/>
+              <a:t>worldpopulationreview.com/countries/</a:t>
+            </a:r>
+          </a:p>
+          <a:p>
+            <a:r>
+              <a:rPr lang="en-US" dirty="0" smtClean="0"/>
+              <a:t>Uganda-population</a:t>
+            </a:r>
+            <a:r>
+              <a:rPr lang="en-US" dirty="0"/>
+              <a:t>/</a:t>
+            </a:r>
+          </a:p>
+          <a:p>
+            <a:r>
+              <a:rPr lang="en-US" dirty="0"/>
+              <a:t>, Nov. 2019</a:t>
+            </a:r>
+            <a:r>
+              <a:rPr lang="en-US" dirty="0" smtClean="0"/>
+              <a:t>.</a:t>
+            </a:r>
+          </a:p>
+          <a:p>
+            <a:r>
+              <a:rPr lang="en-US" dirty="0" smtClean="0"/>
+              <a:t>[</a:t>
+            </a:r>
+            <a:r>
+              <a:rPr lang="en-US" dirty="0"/>
+              <a:t>2] A. Deliamiezade, “Https://www. tandfonline. </a:t>
+            </a:r>
+            <a:r>
+              <a:rPr lang="en-US" dirty="0" smtClean="0"/>
+              <a:t>com/</a:t>
+            </a:r>
+            <a:r>
+              <a:rPr lang="en-US" dirty="0" err="1" smtClean="0"/>
+              <a:t>doi</a:t>
+            </a:r>
+            <a:r>
+              <a:rPr lang="en-US" dirty="0" smtClean="0"/>
+              <a:t>/abs/10.1080/15332640.2018.</a:t>
+            </a:r>
+          </a:p>
+          <a:p>
+            <a:r>
+              <a:rPr lang="en-US" dirty="0" smtClean="0"/>
+              <a:t>1556764</a:t>
+            </a:r>
+            <a:r>
+              <a:rPr lang="en-US" dirty="0"/>
+              <a:t>”, 2019.</a:t>
+            </a:r>
+          </a:p>
+          <a:p>
+            <a:r>
+              <a:rPr lang="en-US" dirty="0"/>
+              <a:t>[3] E. R. Morgan and R. Wall, “Climate change and parasitic disease: Farmer</a:t>
+            </a:r>
+          </a:p>
+          <a:p>
+            <a:r>
+              <a:rPr lang="en-US" dirty="0"/>
+              <a:t>mitigation?”,</a:t>
+            </a:r>
+          </a:p>
+          <a:p>
+            <a:r>
+              <a:rPr lang="en-US" dirty="0"/>
+              <a:t>Trends in parasitology</a:t>
+            </a:r>
+          </a:p>
+          <a:p>
+            <a:r>
+              <a:rPr lang="en-US" dirty="0"/>
+              <a:t>, vol. 25, no. 7, pp. 308–313, 2009.</a:t>
+            </a:r>
+          </a:p>
+          <a:p>
+            <a:r>
+              <a:rPr lang="en-US" dirty="0"/>
+              <a:t>[4] S. Lavender, P. Healy, I. Robinson, R. Lally, S. Ties, D. Lumbroso, E.</a:t>
+            </a:r>
+          </a:p>
+          <a:p>
+            <a:r>
+              <a:rPr lang="en-US" dirty="0"/>
+              <a:t>Valone, G. Gibson, L. Tincani, C. </a:t>
+            </a:r>
+            <a:r>
+              <a:rPr lang="en-US" dirty="0" smtClean="0"/>
+              <a:t>Chambers,et </a:t>
+            </a:r>
+            <a:r>
+              <a:rPr lang="en-US" dirty="0"/>
+              <a:t>al</a:t>
+            </a:r>
+            <a:r>
+              <a:rPr lang="en-US" dirty="0" smtClean="0"/>
+              <a:t>., </a:t>
+            </a:r>
+            <a:r>
+              <a:rPr lang="en-US" dirty="0"/>
+              <a:t>“Application of earth</a:t>
+            </a:r>
+          </a:p>
+          <a:p>
+            <a:r>
+              <a:rPr lang="en-US" dirty="0"/>
+              <a:t>observation to a ugandan drought and flood mitigation service”,</a:t>
+            </a:r>
+          </a:p>
+          <a:p>
+            <a:r>
+              <a:rPr lang="en-US" dirty="0"/>
+              <a:t>[5] P. L. Yates, “Food and agriculture organization of the united nations”,</a:t>
+            </a:r>
+          </a:p>
+          <a:p>
+            <a:r>
+              <a:rPr lang="en-US" dirty="0"/>
+              <a:t>Journal of Farm Economics</a:t>
+            </a:r>
+          </a:p>
+          <a:p>
+            <a:r>
+              <a:rPr lang="en-US" dirty="0"/>
+              <a:t>, vol. 28, no. 1, pp. 54–70, 1946</a:t>
+            </a:r>
+          </a:p>
+          <a:p>
+            <a:pPr marL="0" indent="0">
+              <a:buNone/>
+            </a:pPr>
             <a:endParaRPr lang="en-US" dirty="0"/>
           </a:p>
         </p:txBody>
@@ -13193,8 +13071,38 @@
         <p:spPr>
           <a:xfrm>
             <a:off x="15678150" y="7113588"/>
-            <a:ext cx="12420600" cy="6989508"/>
+            <a:ext cx="12668250" cy="6989508"/>
           </a:xfrm>
+        </p:spPr>
+      </p:pic>
+      <p:pic>
+        <p:nvPicPr>
+          <p:cNvPr id="2" name="Picture 1"/>
+          <p:cNvPicPr>
+            <a:picLocks noChangeAspect="1"/>
+          </p:cNvPicPr>
+          <p:nvPr/>
+        </p:nvPicPr>
+        <p:blipFill>
+          <a:blip r:embed="rId16">
+            <a:extLst>
+              <a:ext uri="{28A0092B-C50C-407E-A947-70E740481C1C}">
+                <a14:useLocalDpi xmlns:a14="http://schemas.microsoft.com/office/drawing/2010/main" val="0"/>
+              </a:ext>
+            </a:extLst>
+          </a:blip>
+          <a:stretch>
+            <a:fillRect/>
+          </a:stretch>
+        </p:blipFill>
+        <p:spPr>
+          <a:xfrm>
+            <a:off x="29900563" y="6949440"/>
+            <a:ext cx="13336335" cy="8716037"/>
+          </a:xfrm>
+          <a:prstGeom prst="rect">
+            <a:avLst/>
+          </a:prstGeom>
         </p:spPr>
       </p:pic>
     </p:spTree>
@@ -13207,6 +13115,13 @@
   <p:clrMapOvr>
     <a:masterClrMapping/>
   </p:clrMapOvr>
+  <p:timing>
+    <p:tnLst>
+      <p:par>
+        <p:cTn id="1" dur="indefinite" restart="never" nodeType="tmRoot"/>
+      </p:par>
+    </p:tnLst>
+  </p:timing>
 </p:sld>
 </file>
 

</xml_diff>